<commit_message>
New image to slides
</commit_message>
<xml_diff>
--- a/common_script/FinalPresentation.pptx
+++ b/common_script/FinalPresentation.pptx
@@ -139,7 +139,7 @@
 <p1510:revInfo xmlns:a="http://schemas.openxmlformats.org/drawingml/2006/main" xmlns:r="http://schemas.openxmlformats.org/officeDocument/2006/relationships" xmlns:p1510="http://schemas.microsoft.com/office/powerpoint/2015/10/main">
   <p1510:revLst>
     <p1510:client id="{8F78352E-5367-6868-1777-35C49C7BAF42}" v="125" dt="2020-05-19T17:59:37.275"/>
-    <p1510:client id="{A216D797-AE79-A50C-AC5F-27B9762B4CCD}" v="75" dt="2020-05-19T18:01:10.485"/>
+    <p1510:client id="{A216D797-AE79-A50C-AC5F-27B9762B4CCD}" v="96" dt="2020-05-19T18:17:32.769"/>
     <p1510:client id="{F20D4288-7282-4BBD-D43C-C61BE1DFCB9D}" v="6" dt="2020-05-19T17:05:04.091"/>
   </p1510:revLst>
 </p1510:revInfo>
@@ -24155,29 +24155,6 @@
           </a:p>
         </p:txBody>
       </p:sp>
-      <p:pic>
-        <p:nvPicPr>
-          <p:cNvPr id="225" name="Google Shape;134;p23"/>
-          <p:cNvPicPr/>
-          <p:nvPr/>
-        </p:nvPicPr>
-        <p:blipFill>
-          <a:blip r:embed="rId3"/>
-          <a:stretch/>
-        </p:blipFill>
-        <p:spPr>
-          <a:xfrm>
-            <a:off x="199440" y="2025360"/>
-            <a:ext cx="4989960" cy="4212000"/>
-          </a:xfrm>
-          <a:prstGeom prst="rect">
-            <a:avLst/>
-          </a:prstGeom>
-          <a:ln>
-            <a:noFill/>
-          </a:ln>
-        </p:spPr>
-      </p:pic>
       <p:sp>
         <p:nvSpPr>
           <p:cNvPr id="226" name="CustomShape 3"/>
@@ -24791,6 +24768,36 @@
           </a:p>
         </p:txBody>
       </p:sp>
+      <p:pic>
+        <p:nvPicPr>
+          <p:cNvPr id="2" name="Picture 2" descr="A picture containing indoor, computer, table, photo&#10;&#10;Description generated with very high confidence">
+            <a:extLst>
+              <a:ext uri="{FF2B5EF4-FFF2-40B4-BE49-F238E27FC236}">
+                <a16:creationId xmlns:a16="http://schemas.microsoft.com/office/drawing/2014/main" id="{C628DCB9-91EF-4429-883A-6E4DF1A25110}"/>
+              </a:ext>
+            </a:extLst>
+          </p:cNvPr>
+          <p:cNvPicPr>
+            <a:picLocks noChangeAspect="1"/>
+          </p:cNvPicPr>
+          <p:nvPr/>
+        </p:nvPicPr>
+        <p:blipFill>
+          <a:blip r:embed="rId3"/>
+          <a:stretch>
+            <a:fillRect/>
+          </a:stretch>
+        </p:blipFill>
+        <p:spPr>
+          <a:xfrm>
+            <a:off x="38100" y="1038225"/>
+            <a:ext cx="5695950" cy="4276725"/>
+          </a:xfrm>
+          <a:prstGeom prst="rect">
+            <a:avLst/>
+          </a:prstGeom>
+        </p:spPr>
+      </p:pic>
     </p:spTree>
   </p:cSld>
   <p:clrMapOvr>
@@ -25591,7 +25598,7 @@
           <a:fontRef idx="minor"/>
         </p:style>
         <p:txBody>
-          <a:bodyPr tIns="91440" bIns="91440"/>
+          <a:bodyPr tIns="91440" bIns="91440" anchor="t"/>
           <a:lstStyle/>
           <a:p>
             <a:pPr>
@@ -25600,7 +25607,7 @@
               </a:lnSpc>
             </a:pPr>
             <a:r>
-              <a:rPr lang="en-US" sz="2400" b="0" u="sng" strike="noStrike" spc="-1">
+              <a:rPr lang="en-US" sz="2400" b="0" u="sng" strike="noStrike" spc="-1" dirty="0">
                 <a:solidFill>
                   <a:srgbClr val="000000"/>
                 </a:solidFill>
@@ -25610,7 +25617,7 @@
               </a:rPr>
               <a:t>Objective Function</a:t>
             </a:r>
-            <a:endParaRPr lang="en-US" sz="2400" b="0" strike="noStrike" spc="-1">
+            <a:endParaRPr lang="en-US" sz="2400" b="0" strike="noStrike" spc="-1" dirty="0">
               <a:latin typeface="Arial"/>
             </a:endParaRPr>
           </a:p>
@@ -25621,7 +25628,7 @@
               </a:lnSpc>
             </a:pPr>
             <a:r>
-              <a:rPr lang="en-US" sz="1800" b="0" strike="noStrike" spc="-1">
+              <a:rPr lang="en-US" sz="1800" b="0" strike="noStrike" spc="-1" dirty="0">
                 <a:solidFill>
                   <a:srgbClr val="000000"/>
                 </a:solidFill>
@@ -25630,12 +25637,12 @@
               </a:rPr>
               <a:t>Two possible design choices</a:t>
             </a:r>
-            <a:endParaRPr lang="en-US" sz="1800" b="0" strike="noStrike" spc="-1">
-              <a:latin typeface="Arial"/>
-            </a:endParaRPr>
-          </a:p>
-          <a:p>
-            <a:pPr marL="457200" indent="-342720">
+            <a:endParaRPr lang="en-US" sz="1800" b="0" strike="noStrike" spc="-1" dirty="0">
+              <a:latin typeface="Arial"/>
+            </a:endParaRPr>
+          </a:p>
+          <a:p>
+            <a:pPr marL="457200" indent="-342265">
               <a:lnSpc>
                 <a:spcPct val="100000"/>
               </a:lnSpc>
@@ -25646,24 +25653,41 @@
               <a:buAutoNum type="arabicPeriod"/>
             </a:pPr>
             <a:r>
-              <a:rPr lang="en-US" sz="1800" b="0" strike="noStrike" spc="-1">
+              <a:rPr lang="en-US" sz="1800" b="0" strike="noStrike" spc="-1" dirty="0">
                 <a:solidFill>
                   <a:srgbClr val="000000"/>
                 </a:solidFill>
                 <a:latin typeface="Roboto"/>
                 <a:ea typeface="Roboto"/>
               </a:rPr>
-              <a:t>Minimize the network operation &amp; installation cost for given user-service paris.</a:t>
-            </a:r>
-            <a:endParaRPr lang="en-US" sz="1800" b="0" strike="noStrike" spc="-1">
-              <a:latin typeface="Arial"/>
-            </a:endParaRPr>
-          </a:p>
-          <a:p>
-            <a:pPr marL="457200" indent="-342720">
-              <a:lnSpc>
-                <a:spcPct val="100000"/>
-              </a:lnSpc>
+              <a:t>Minimize the network operation &amp; installation cost for given user-service </a:t>
+            </a:r>
+            <a:r>
+              <a:rPr lang="en-US" spc="-1" dirty="0">
+                <a:solidFill>
+                  <a:srgbClr val="000000"/>
+                </a:solidFill>
+                <a:latin typeface="Roboto"/>
+                <a:ea typeface="Roboto"/>
+              </a:rPr>
+              <a:t>pairs</a:t>
+            </a:r>
+            <a:r>
+              <a:rPr lang="en-US" sz="1800" b="0" strike="noStrike" spc="-1" dirty="0">
+                <a:solidFill>
+                  <a:srgbClr val="000000"/>
+                </a:solidFill>
+                <a:latin typeface="Roboto"/>
+                <a:ea typeface="Roboto"/>
+              </a:rPr>
+              <a:t>.</a:t>
+            </a:r>
+            <a:endParaRPr lang="en-US" sz="1800" b="0" strike="noStrike" spc="-1" dirty="0">
+              <a:latin typeface="Arial"/>
+            </a:endParaRPr>
+          </a:p>
+          <a:p>
+            <a:pPr marL="457200" indent="-342265">
               <a:buClr>
                 <a:srgbClr val="000000"/>
               </a:buClr>
@@ -25671,16 +25695,46 @@
               <a:buAutoNum type="arabicPeriod"/>
             </a:pPr>
             <a:r>
-              <a:rPr lang="en-US" sz="1800" b="0" strike="noStrike" spc="-1">
+              <a:rPr lang="en-US" sz="1800" b="0" strike="noStrike" spc="-1" dirty="0">
                 <a:solidFill>
                   <a:srgbClr val="000000"/>
                 </a:solidFill>
                 <a:latin typeface="Roboto"/>
                 <a:ea typeface="Roboto"/>
               </a:rPr>
-              <a:t>Maximize the number of served user-service paris for a given network configuration. </a:t>
-            </a:r>
-            <a:endParaRPr lang="en-US" sz="1800" b="0" strike="noStrike" spc="-1">
+              <a:t>Maximize the number of served user-service </a:t>
+            </a:r>
+            <a:r>
+              <a:rPr lang="en-US" spc="-1" dirty="0">
+                <a:solidFill>
+                  <a:srgbClr val="000000"/>
+                </a:solidFill>
+                <a:latin typeface="Roboto"/>
+                <a:ea typeface="Roboto"/>
+              </a:rPr>
+              <a:t>pairs for </a:t>
+            </a:r>
+            <a:r>
+              <a:rPr lang="en-US" sz="1800" b="0" strike="noStrike" spc="-1" dirty="0">
+                <a:solidFill>
+                  <a:srgbClr val="000000"/>
+                </a:solidFill>
+                <a:latin typeface="Roboto"/>
+                <a:ea typeface="Roboto"/>
+              </a:rPr>
+              <a:t>a given network configuration.</a:t>
+            </a:r>
+            <a:r>
+              <a:rPr lang="en-US" spc="-1" dirty="0">
+                <a:solidFill>
+                  <a:srgbClr val="000000"/>
+                </a:solidFill>
+                <a:latin typeface="Roboto"/>
+                <a:ea typeface="Roboto"/>
+              </a:rPr>
+              <a:t> </a:t>
+            </a:r>
+            <a:endParaRPr lang="en-US" sz="1800" b="0" strike="noStrike" spc="-1" dirty="0">
               <a:latin typeface="Arial"/>
             </a:endParaRPr>
           </a:p>

</xml_diff>